<commit_message>
small change to annotation for lecture 17
</commit_message>
<xml_diff>
--- a/classes/stats2016/Lecture17.pptx
+++ b/classes/stats2016/Lecture17.pptx
@@ -147,6 +147,22 @@
       </a:defRPr>
     </a:lvl9pPr>
   </p:defaultTextStyle>
+  <p:extLst>
+    <p:ext uri="{EFAFB233-063F-42B5-8137-9DF3F51BA10A}">
+      <p15:sldGuideLst xmlns:p15="http://schemas.microsoft.com/office/powerpoint/2012/main">
+        <p15:guide id="1" orient="horz" pos="2160">
+          <p15:clr>
+            <a:srgbClr val="A4A3A4"/>
+          </p15:clr>
+        </p15:guide>
+        <p15:guide id="2" pos="2880">
+          <p15:clr>
+            <a:srgbClr val="A4A3A4"/>
+          </p15:clr>
+        </p15:guide>
+      </p15:sldGuideLst>
+    </p:ext>
+  </p:extLst>
 </p:presentation>
 </file>
 
@@ -233,7 +249,7 @@
             <a:fld id="{E5169B60-3AE0-4892-BDF6-E4160B08E8B2}" type="datetimeFigureOut">
               <a:rPr lang="en-US" smtClean="0"/>
               <a:pPr/>
-              <a:t>4/3/2015</a:t>
+              <a:t>3/26/2016</a:t>
             </a:fld>
             <a:endParaRPr lang="en-US"/>
           </a:p>
@@ -402,6 +418,11 @@
         </p:txBody>
       </p:sp>
     </p:spTree>
+    <p:extLst>
+      <p:ext uri="{BB962C8B-B14F-4D97-AF65-F5344CB8AC3E}">
+        <p14:creationId xmlns:p14="http://schemas.microsoft.com/office/powerpoint/2010/main" val="2633293040"/>
+      </p:ext>
+    </p:extLst>
   </p:cSld>
   <p:clrMap bg1="lt1" tx1="dk1" bg2="lt2" tx2="dk2" accent1="accent1" accent2="accent2" accent3="accent3" accent4="accent4" accent5="accent5" accent6="accent6" hlink="hlink" folHlink="folHlink"/>
   <p:notesStyle>
@@ -574,6 +595,11 @@
         </p:txBody>
       </p:sp>
     </p:spTree>
+    <p:extLst>
+      <p:ext uri="{BB962C8B-B14F-4D97-AF65-F5344CB8AC3E}">
+        <p14:creationId xmlns:p14="http://schemas.microsoft.com/office/powerpoint/2010/main" val="3068029593"/>
+      </p:ext>
+    </p:extLst>
   </p:cSld>
   <p:clrMapOvr>
     <a:masterClrMapping/>
@@ -656,6 +682,11 @@
         </p:txBody>
       </p:sp>
     </p:spTree>
+    <p:extLst>
+      <p:ext uri="{BB962C8B-B14F-4D97-AF65-F5344CB8AC3E}">
+        <p14:creationId xmlns:p14="http://schemas.microsoft.com/office/powerpoint/2010/main" val="2878881350"/>
+      </p:ext>
+    </p:extLst>
   </p:cSld>
   <p:clrMapOvr>
     <a:masterClrMapping/>
@@ -738,6 +769,11 @@
         </p:txBody>
       </p:sp>
     </p:spTree>
+    <p:extLst>
+      <p:ext uri="{BB962C8B-B14F-4D97-AF65-F5344CB8AC3E}">
+        <p14:creationId xmlns:p14="http://schemas.microsoft.com/office/powerpoint/2010/main" val="1041785686"/>
+      </p:ext>
+    </p:extLst>
   </p:cSld>
   <p:clrMapOvr>
     <a:masterClrMapping/>
@@ -820,6 +856,11 @@
         </p:txBody>
       </p:sp>
     </p:spTree>
+    <p:extLst>
+      <p:ext uri="{BB962C8B-B14F-4D97-AF65-F5344CB8AC3E}">
+        <p14:creationId xmlns:p14="http://schemas.microsoft.com/office/powerpoint/2010/main" val="4274167312"/>
+      </p:ext>
+    </p:extLst>
   </p:cSld>
   <p:clrMapOvr>
     <a:masterClrMapping/>
@@ -902,6 +943,11 @@
         </p:txBody>
       </p:sp>
     </p:spTree>
+    <p:extLst>
+      <p:ext uri="{BB962C8B-B14F-4D97-AF65-F5344CB8AC3E}">
+        <p14:creationId xmlns:p14="http://schemas.microsoft.com/office/powerpoint/2010/main" val="1376330320"/>
+      </p:ext>
+    </p:extLst>
   </p:cSld>
   <p:clrMapOvr>
     <a:masterClrMapping/>
@@ -984,6 +1030,11 @@
         </p:txBody>
       </p:sp>
     </p:spTree>
+    <p:extLst>
+      <p:ext uri="{BB962C8B-B14F-4D97-AF65-F5344CB8AC3E}">
+        <p14:creationId xmlns:p14="http://schemas.microsoft.com/office/powerpoint/2010/main" val="2888733840"/>
+      </p:ext>
+    </p:extLst>
   </p:cSld>
   <p:clrMapOvr>
     <a:masterClrMapping/>
@@ -1066,6 +1117,11 @@
         </p:txBody>
       </p:sp>
     </p:spTree>
+    <p:extLst>
+      <p:ext uri="{BB962C8B-B14F-4D97-AF65-F5344CB8AC3E}">
+        <p14:creationId xmlns:p14="http://schemas.microsoft.com/office/powerpoint/2010/main" val="3496955480"/>
+      </p:ext>
+    </p:extLst>
   </p:cSld>
   <p:clrMapOvr>
     <a:masterClrMapping/>
@@ -1148,6 +1204,11 @@
         </p:txBody>
       </p:sp>
     </p:spTree>
+    <p:extLst>
+      <p:ext uri="{BB962C8B-B14F-4D97-AF65-F5344CB8AC3E}">
+        <p14:creationId xmlns:p14="http://schemas.microsoft.com/office/powerpoint/2010/main" val="2577016972"/>
+      </p:ext>
+    </p:extLst>
   </p:cSld>
   <p:clrMapOvr>
     <a:masterClrMapping/>
@@ -1230,6 +1291,11 @@
         </p:txBody>
       </p:sp>
     </p:spTree>
+    <p:extLst>
+      <p:ext uri="{BB962C8B-B14F-4D97-AF65-F5344CB8AC3E}">
+        <p14:creationId xmlns:p14="http://schemas.microsoft.com/office/powerpoint/2010/main" val="1311660127"/>
+      </p:ext>
+    </p:extLst>
   </p:cSld>
   <p:clrMapOvr>
     <a:masterClrMapping/>
@@ -1312,6 +1378,11 @@
         </p:txBody>
       </p:sp>
     </p:spTree>
+    <p:extLst>
+      <p:ext uri="{BB962C8B-B14F-4D97-AF65-F5344CB8AC3E}">
+        <p14:creationId xmlns:p14="http://schemas.microsoft.com/office/powerpoint/2010/main" val="2940025045"/>
+      </p:ext>
+    </p:extLst>
   </p:cSld>
   <p:clrMapOvr>
     <a:masterClrMapping/>
@@ -1501,7 +1572,7 @@
             <a:fld id="{1D8BD707-D9CF-40AE-B4C6-C98DA3205C09}" type="datetimeFigureOut">
               <a:rPr lang="en-US" smtClean="0"/>
               <a:pPr/>
-              <a:t>4/3/2015</a:t>
+              <a:t>3/26/2016</a:t>
             </a:fld>
             <a:endParaRPr lang="en-US"/>
           </a:p>
@@ -1668,7 +1739,7 @@
             <a:fld id="{1D8BD707-D9CF-40AE-B4C6-C98DA3205C09}" type="datetimeFigureOut">
               <a:rPr lang="en-US" smtClean="0"/>
               <a:pPr/>
-              <a:t>4/3/2015</a:t>
+              <a:t>3/26/2016</a:t>
             </a:fld>
             <a:endParaRPr lang="en-US"/>
           </a:p>
@@ -1845,7 +1916,7 @@
             <a:fld id="{1D8BD707-D9CF-40AE-B4C6-C98DA3205C09}" type="datetimeFigureOut">
               <a:rPr lang="en-US" smtClean="0"/>
               <a:pPr/>
-              <a:t>4/3/2015</a:t>
+              <a:t>3/26/2016</a:t>
             </a:fld>
             <a:endParaRPr lang="en-US"/>
           </a:p>
@@ -2012,7 +2083,7 @@
             <a:fld id="{1D8BD707-D9CF-40AE-B4C6-C98DA3205C09}" type="datetimeFigureOut">
               <a:rPr lang="en-US" smtClean="0"/>
               <a:pPr/>
-              <a:t>4/3/2015</a:t>
+              <a:t>3/26/2016</a:t>
             </a:fld>
             <a:endParaRPr lang="en-US"/>
           </a:p>
@@ -2255,7 +2326,7 @@
             <a:fld id="{1D8BD707-D9CF-40AE-B4C6-C98DA3205C09}" type="datetimeFigureOut">
               <a:rPr lang="en-US" smtClean="0"/>
               <a:pPr/>
-              <a:t>4/3/2015</a:t>
+              <a:t>3/26/2016</a:t>
             </a:fld>
             <a:endParaRPr lang="en-US"/>
           </a:p>
@@ -2540,7 +2611,7 @@
             <a:fld id="{1D8BD707-D9CF-40AE-B4C6-C98DA3205C09}" type="datetimeFigureOut">
               <a:rPr lang="en-US" smtClean="0"/>
               <a:pPr/>
-              <a:t>4/3/2015</a:t>
+              <a:t>3/26/2016</a:t>
             </a:fld>
             <a:endParaRPr lang="en-US"/>
           </a:p>
@@ -2959,7 +3030,7 @@
             <a:fld id="{1D8BD707-D9CF-40AE-B4C6-C98DA3205C09}" type="datetimeFigureOut">
               <a:rPr lang="en-US" smtClean="0"/>
               <a:pPr/>
-              <a:t>4/3/2015</a:t>
+              <a:t>3/26/2016</a:t>
             </a:fld>
             <a:endParaRPr lang="en-US"/>
           </a:p>
@@ -3074,7 +3145,7 @@
             <a:fld id="{1D8BD707-D9CF-40AE-B4C6-C98DA3205C09}" type="datetimeFigureOut">
               <a:rPr lang="en-US" smtClean="0"/>
               <a:pPr/>
-              <a:t>4/3/2015</a:t>
+              <a:t>3/26/2016</a:t>
             </a:fld>
             <a:endParaRPr lang="en-US"/>
           </a:p>
@@ -3166,7 +3237,7 @@
             <a:fld id="{1D8BD707-D9CF-40AE-B4C6-C98DA3205C09}" type="datetimeFigureOut">
               <a:rPr lang="en-US" smtClean="0"/>
               <a:pPr/>
-              <a:t>4/3/2015</a:t>
+              <a:t>3/26/2016</a:t>
             </a:fld>
             <a:endParaRPr lang="en-US"/>
           </a:p>
@@ -3440,7 +3511,7 @@
             <a:fld id="{1D8BD707-D9CF-40AE-B4C6-C98DA3205C09}" type="datetimeFigureOut">
               <a:rPr lang="en-US" smtClean="0"/>
               <a:pPr/>
-              <a:t>4/3/2015</a:t>
+              <a:t>3/26/2016</a:t>
             </a:fld>
             <a:endParaRPr lang="en-US"/>
           </a:p>
@@ -3690,7 +3761,7 @@
             <a:fld id="{1D8BD707-D9CF-40AE-B4C6-C98DA3205C09}" type="datetimeFigureOut">
               <a:rPr lang="en-US" smtClean="0"/>
               <a:pPr/>
-              <a:t>4/3/2015</a:t>
+              <a:t>3/26/2016</a:t>
             </a:fld>
             <a:endParaRPr lang="en-US"/>
           </a:p>
@@ -3900,7 +3971,7 @@
             <a:fld id="{1D8BD707-D9CF-40AE-B4C6-C98DA3205C09}" type="datetimeFigureOut">
               <a:rPr lang="en-US" smtClean="0"/>
               <a:pPr/>
-              <a:t>4/3/2015</a:t>
+              <a:t>3/26/2016</a:t>
             </a:fld>
             <a:endParaRPr lang="en-US"/>
           </a:p>
@@ -10143,14 +10214,7 @@
                 <a:latin typeface="Arial" pitchFamily="34" charset="0"/>
                 <a:cs typeface="Arial" pitchFamily="34" charset="0"/>
               </a:rPr>
-              <a:t>A closely related alternative to this </a:t>
-            </a:r>
-            <a:r>
-              <a:rPr lang="en-US" dirty="0" smtClean="0">
-                <a:latin typeface="Arial" pitchFamily="34" charset="0"/>
-                <a:cs typeface="Arial" pitchFamily="34" charset="0"/>
-              </a:rPr>
-              <a:t>is the Bayesian information criterion</a:t>
+              <a:t>A closely related alternative to this is the Bayesian information criterion</a:t>
             </a:r>
             <a:endParaRPr lang="en-US" dirty="0">
               <a:latin typeface="Arial" pitchFamily="34" charset="0"/>
@@ -11185,6 +11249,36 @@
               </a:rPr>
               <a:t>=3)</a:t>
             </a:r>
+          </a:p>
+        </p:txBody>
+      </p:sp>
+      <p:sp>
+        <p:nvSpPr>
+          <p:cNvPr id="2" name="TextBox 1"/>
+          <p:cNvSpPr txBox="1"/>
+          <p:nvPr/>
+        </p:nvSpPr>
+        <p:spPr>
+          <a:xfrm>
+            <a:off x="1650984" y="6019800"/>
+            <a:ext cx="5359416" cy="369332"/>
+          </a:xfrm>
+          <a:prstGeom prst="rect">
+            <a:avLst/>
+          </a:prstGeom>
+          <a:noFill/>
+        </p:spPr>
+        <p:txBody>
+          <a:bodyPr wrap="none" rtlCol="0">
+            <a:spAutoFit/>
+          </a:bodyPr>
+          <a:lstStyle/>
+          <a:p>
+            <a:r>
+              <a:rPr lang="en-US" dirty="0" smtClean="0"/>
+              <a:t>(to simplify, we only show one of the four model lines!)</a:t>
+            </a:r>
+            <a:endParaRPr lang="en-US" dirty="0"/>
           </a:p>
         </p:txBody>
       </p:sp>

</xml_diff>